<commit_message>
added So it Goes
</commit_message>
<xml_diff>
--- a/HSTR121/ppts/PunkRock.pptx
+++ b/HSTR121/ppts/PunkRock.pptx
@@ -256,7 +256,7 @@
           <a:p>
             <a:fld id="{802CF8DB-62E5-41AE-946A-AEF6F789F692}" type="datetimeFigureOut">
               <a:rPr lang="en-US" smtClean="0"/>
-              <a:t>3/19/18</a:t>
+              <a:t>3/21/18</a:t>
             </a:fld>
             <a:endParaRPr lang="en-US"/>
           </a:p>
@@ -424,7 +424,7 @@
           <a:p>
             <a:fld id="{802CF8DB-62E5-41AE-946A-AEF6F789F692}" type="datetimeFigureOut">
               <a:rPr lang="en-US" smtClean="0"/>
-              <a:t>3/19/18</a:t>
+              <a:t>3/21/18</a:t>
             </a:fld>
             <a:endParaRPr lang="en-US"/>
           </a:p>
@@ -602,7 +602,7 @@
           <a:p>
             <a:fld id="{802CF8DB-62E5-41AE-946A-AEF6F789F692}" type="datetimeFigureOut">
               <a:rPr lang="en-US" smtClean="0"/>
-              <a:t>3/19/18</a:t>
+              <a:t>3/21/18</a:t>
             </a:fld>
             <a:endParaRPr lang="en-US"/>
           </a:p>
@@ -770,7 +770,7 @@
           <a:p>
             <a:fld id="{802CF8DB-62E5-41AE-946A-AEF6F789F692}" type="datetimeFigureOut">
               <a:rPr lang="en-US" smtClean="0"/>
-              <a:t>3/19/18</a:t>
+              <a:t>3/21/18</a:t>
             </a:fld>
             <a:endParaRPr lang="en-US"/>
           </a:p>
@@ -1015,7 +1015,7 @@
           <a:p>
             <a:fld id="{802CF8DB-62E5-41AE-946A-AEF6F789F692}" type="datetimeFigureOut">
               <a:rPr lang="en-US" smtClean="0"/>
-              <a:t>3/19/18</a:t>
+              <a:t>3/21/18</a:t>
             </a:fld>
             <a:endParaRPr lang="en-US"/>
           </a:p>
@@ -1244,7 +1244,7 @@
           <a:p>
             <a:fld id="{802CF8DB-62E5-41AE-946A-AEF6F789F692}" type="datetimeFigureOut">
               <a:rPr lang="en-US" smtClean="0"/>
-              <a:t>3/19/18</a:t>
+              <a:t>3/21/18</a:t>
             </a:fld>
             <a:endParaRPr lang="en-US"/>
           </a:p>
@@ -1608,7 +1608,7 @@
           <a:p>
             <a:fld id="{802CF8DB-62E5-41AE-946A-AEF6F789F692}" type="datetimeFigureOut">
               <a:rPr lang="en-US" smtClean="0"/>
-              <a:t>3/19/18</a:t>
+              <a:t>3/21/18</a:t>
             </a:fld>
             <a:endParaRPr lang="en-US"/>
           </a:p>
@@ -1725,7 +1725,7 @@
           <a:p>
             <a:fld id="{802CF8DB-62E5-41AE-946A-AEF6F789F692}" type="datetimeFigureOut">
               <a:rPr lang="en-US" smtClean="0"/>
-              <a:t>3/19/18</a:t>
+              <a:t>3/21/18</a:t>
             </a:fld>
             <a:endParaRPr lang="en-US"/>
           </a:p>
@@ -1820,7 +1820,7 @@
           <a:p>
             <a:fld id="{802CF8DB-62E5-41AE-946A-AEF6F789F692}" type="datetimeFigureOut">
               <a:rPr lang="en-US" smtClean="0"/>
-              <a:t>3/19/18</a:t>
+              <a:t>3/21/18</a:t>
             </a:fld>
             <a:endParaRPr lang="en-US"/>
           </a:p>
@@ -2095,7 +2095,7 @@
           <a:p>
             <a:fld id="{802CF8DB-62E5-41AE-946A-AEF6F789F692}" type="datetimeFigureOut">
               <a:rPr lang="en-US" smtClean="0"/>
-              <a:t>3/19/18</a:t>
+              <a:t>3/21/18</a:t>
             </a:fld>
             <a:endParaRPr lang="en-US"/>
           </a:p>
@@ -2347,7 +2347,7 @@
           <a:p>
             <a:fld id="{802CF8DB-62E5-41AE-946A-AEF6F789F692}" type="datetimeFigureOut">
               <a:rPr lang="en-US" smtClean="0"/>
-              <a:t>3/19/18</a:t>
+              <a:t>3/21/18</a:t>
             </a:fld>
             <a:endParaRPr lang="en-US"/>
           </a:p>
@@ -2568,7 +2568,7 @@
           <a:p>
             <a:fld id="{802CF8DB-62E5-41AE-946A-AEF6F789F692}" type="datetimeFigureOut">
               <a:rPr lang="en-US" smtClean="0"/>
-              <a:t>3/19/18</a:t>
+              <a:t>3/21/18</a:t>
             </a:fld>
             <a:endParaRPr lang="en-US"/>
           </a:p>
@@ -3482,9 +3482,36 @@
               <a:rPr lang="en-US" sz="2800" dirty="0">
                 <a:latin typeface="Aharoni" panose="02010803020104030203" pitchFamily="2" charset="-79"/>
                 <a:cs typeface="Aharoni" panose="02010803020104030203" pitchFamily="2" charset="-79"/>
-                <a:hlinkClick r:id="rId2"/>
               </a:rPr>
-              <a:t>https://www.youtube.com/watch?v=DaZ0V3ukjTg</a:t>
+              <a:t>https://</a:t>
+            </a:r>
+            <a:r>
+              <a:rPr lang="en-US" sz="2800" dirty="0" err="1">
+                <a:latin typeface="Aharoni" panose="02010803020104030203" pitchFamily="2" charset="-79"/>
+                <a:cs typeface="Aharoni" panose="02010803020104030203" pitchFamily="2" charset="-79"/>
+              </a:rPr>
+              <a:t>www.youtube.com</a:t>
+            </a:r>
+            <a:r>
+              <a:rPr lang="en-US" sz="2800" dirty="0">
+                <a:latin typeface="Aharoni" panose="02010803020104030203" pitchFamily="2" charset="-79"/>
+                <a:cs typeface="Aharoni" panose="02010803020104030203" pitchFamily="2" charset="-79"/>
+              </a:rPr>
+              <a:t>/</a:t>
+            </a:r>
+            <a:r>
+              <a:rPr lang="en-US" sz="2800" dirty="0" err="1">
+                <a:latin typeface="Aharoni" panose="02010803020104030203" pitchFamily="2" charset="-79"/>
+                <a:cs typeface="Aharoni" panose="02010803020104030203" pitchFamily="2" charset="-79"/>
+              </a:rPr>
+              <a:t>watch?v</a:t>
+            </a:r>
+            <a:r>
+              <a:rPr lang="en-US" sz="2800" dirty="0">
+                <a:latin typeface="Aharoni" panose="02010803020104030203" pitchFamily="2" charset="-79"/>
+                <a:cs typeface="Aharoni" panose="02010803020104030203" pitchFamily="2" charset="-79"/>
+              </a:rPr>
+              <a:t>=xqbXqYdafi8</a:t>
             </a:r>
             <a:br>
               <a:rPr lang="en-US" sz="2800" dirty="0">
@@ -3510,7 +3537,7 @@
           </p:nvPr>
         </p:nvPicPr>
         <p:blipFill>
-          <a:blip r:embed="rId3">
+          <a:blip r:embed="rId2">
             <a:extLst>
               <a:ext uri="{28A0092B-C50C-407E-A947-70E740481C1C}">
                 <a14:useLocalDpi xmlns:a14="http://schemas.microsoft.com/office/drawing/2010/main" val="0"/>
@@ -3599,7 +3626,7 @@
         <p:spPr/>
         <p:txBody>
           <a:bodyPr>
-            <a:normAutofit/>
+            <a:normAutofit lnSpcReduction="10000"/>
           </a:bodyPr>
           <a:lstStyle/>
           <a:p>
@@ -3620,8 +3647,17 @@
           <a:p>
             <a:r>
               <a:rPr lang="en-US" dirty="0"/>
-              <a:t>Tony Wilson (TV “So It Goes”)</a:t>
-            </a:r>
+              <a:t>Tony Wilson (TV “So It Goes”):</a:t>
+            </a:r>
+          </a:p>
+          <a:p>
+            <a:r>
+              <a:rPr lang="en-US" dirty="0">
+                <a:hlinkClick r:id="rId3"/>
+              </a:rPr>
+              <a:t>https://www.youtube.com/watch?v=rrjcsMidMNY</a:t>
+            </a:r>
+            <a:endParaRPr lang="en-US" dirty="0"/>
           </a:p>
           <a:p>
             <a:r>
@@ -3774,15 +3810,7 @@
           <a:p>
             <a:r>
               <a:rPr lang="en-US" dirty="0"/>
-              <a:t>Sid Vicious replaced Matlock, </a:t>
-            </a:r>
-            <a:r>
-              <a:rPr lang="en-US"/>
-              <a:t>who liked </a:t>
-            </a:r>
-            <a:r>
-              <a:rPr lang="en-US" dirty="0"/>
-              <a:t>the Beatles and did not want to be a “fascist”.</a:t>
+              <a:t>Sid Vicious replaced Matlock, who liked the Beatles and did not want to be a “fascist”.</a:t>
             </a:r>
           </a:p>
           <a:p>

</xml_diff>